<commit_message>
Mejoras en la presentación
</commit_message>
<xml_diff>
--- a/Presentación.pptx
+++ b/Presentación.pptx
@@ -244,7 +244,7 @@
           <a:p>
             <a:fld id="{1CA5457B-CDAE-4DEB-AEC8-C82DE2312E37}" type="datetimeFigureOut">
               <a:rPr lang="en-US" smtClean="0"/>
-              <a:t>5/31/2021</a:t>
+              <a:t>6/9/2021</a:t>
             </a:fld>
             <a:endParaRPr lang="en-US" dirty="0"/>
           </a:p>
@@ -421,7 +421,7 @@
           <a:p>
             <a:fld id="{090B78EA-28CE-41D8-9043-90E391E5F567}" type="datetimeFigureOut">
               <a:rPr lang="en-US" noProof="0" smtClean="0"/>
-              <a:t>5/31/2021</a:t>
+              <a:t>6/9/2021</a:t>
             </a:fld>
             <a:endParaRPr lang="en-US" noProof="0" dirty="0"/>
           </a:p>
@@ -26493,6 +26493,81 @@
           </a:p>
         </p:txBody>
       </p:sp>
+      <p:sp>
+        <p:nvSpPr>
+          <p:cNvPr id="6" name="Text Placeholder 9">
+            <a:extLst>
+              <a:ext uri="{FF2B5EF4-FFF2-40B4-BE49-F238E27FC236}">
+                <a16:creationId xmlns:a16="http://schemas.microsoft.com/office/drawing/2014/main" id="{75CA1CE6-CA2F-4625-B2A9-5170BBDA09F0}"/>
+              </a:ext>
+            </a:extLst>
+          </p:cNvPr>
+          <p:cNvSpPr>
+            <a:spLocks noGrp="1"/>
+          </p:cNvSpPr>
+          <p:nvPr>
+            <p:ph type="body" sz="quarter" idx="13"/>
+          </p:nvPr>
+        </p:nvSpPr>
+        <p:spPr>
+          <a:xfrm>
+            <a:off x="444500" y="1333799"/>
+            <a:ext cx="6718300" cy="5163838"/>
+          </a:xfrm>
+        </p:spPr>
+        <p:txBody>
+          <a:bodyPr/>
+          <a:lstStyle/>
+          <a:p>
+            <a:r>
+              <a:rPr lang="es-ES" dirty="0"/>
+              <a:t>La vamos a dividir en 2 partes</a:t>
+            </a:r>
+          </a:p>
+          <a:p>
+            <a:pPr lvl="1"/>
+            <a:r>
+              <a:rPr lang="es-ES" dirty="0"/>
+              <a:t>Juan Gómez Mateos</a:t>
+            </a:r>
+          </a:p>
+          <a:p>
+            <a:pPr lvl="2"/>
+            <a:r>
+              <a:rPr lang="es-ES" dirty="0"/>
+              <a:t>Demostración de funcionamiento del inicio de sesión y perfil del usuario</a:t>
+            </a:r>
+          </a:p>
+          <a:p>
+            <a:pPr lvl="2"/>
+            <a:r>
+              <a:rPr lang="es-ES" dirty="0"/>
+              <a:t>Explicación del código</a:t>
+            </a:r>
+          </a:p>
+          <a:p>
+            <a:pPr lvl="1"/>
+            <a:r>
+              <a:rPr lang="es-ES" dirty="0"/>
+              <a:t>Antonio Prieto Tagua</a:t>
+            </a:r>
+          </a:p>
+          <a:p>
+            <a:pPr lvl="2"/>
+            <a:r>
+              <a:rPr lang="es-ES" dirty="0"/>
+              <a:t>Demostración de funcionamiento de como realizar reservas, ver activas y finalizadas</a:t>
+            </a:r>
+          </a:p>
+          <a:p>
+            <a:pPr lvl="2"/>
+            <a:r>
+              <a:rPr lang="es-ES" dirty="0"/>
+              <a:t>Explicación del código</a:t>
+            </a:r>
+          </a:p>
+        </p:txBody>
+      </p:sp>
     </p:spTree>
     <p:extLst>
       <p:ext uri="{BB962C8B-B14F-4D97-AF65-F5344CB8AC3E}">
@@ -27379,11 +27454,12 @@
 </file>
 
 <file path=customXml/item1.xml><?xml version="1.0" encoding="utf-8"?>
-<p:properties xmlns:p="http://schemas.microsoft.com/office/2006/metadata/properties" xmlns:xsi="http://www.w3.org/2001/XMLSchema-instance" xmlns:pc="http://schemas.microsoft.com/office/infopath/2007/PartnerControls">
-  <documentManagement>
-    <MediaServiceKeyPoints xmlns="71af3243-3dd4-4a8d-8c0d-dd76da1f02a5" xsi:nil="true"/>
-  </documentManagement>
-</p:properties>
+<?mso-contentType ?>
+<FormTemplates xmlns="http://schemas.microsoft.com/sharepoint/v3/contenttype/forms">
+  <Display>DocumentLibraryForm</Display>
+  <Edit>DocumentLibraryForm</Edit>
+  <New>DocumentLibraryForm</New>
+</FormTemplates>
 </file>
 
 <file path=customXml/item2.xml><?xml version="1.0" encoding="utf-8"?>
@@ -27598,20 +27674,17 @@
 </file>
 
 <file path=customXml/item3.xml><?xml version="1.0" encoding="utf-8"?>
-<?mso-contentType ?>
-<FormTemplates xmlns="http://schemas.microsoft.com/sharepoint/v3/contenttype/forms">
-  <Display>DocumentLibraryForm</Display>
-  <Edit>DocumentLibraryForm</Edit>
-  <New>DocumentLibraryForm</New>
-</FormTemplates>
+<p:properties xmlns:p="http://schemas.microsoft.com/office/2006/metadata/properties" xmlns:xsi="http://www.w3.org/2001/XMLSchema-instance" xmlns:pc="http://schemas.microsoft.com/office/infopath/2007/PartnerControls">
+  <documentManagement>
+    <MediaServiceKeyPoints xmlns="71af3243-3dd4-4a8d-8c0d-dd76da1f02a5" xsi:nil="true"/>
+  </documentManagement>
+</p:properties>
 </file>
 
 <file path=customXml/itemProps1.xml><?xml version="1.0" encoding="utf-8"?>
-<ds:datastoreItem xmlns:ds="http://schemas.openxmlformats.org/officeDocument/2006/customXml" ds:itemID="{F5757914-1161-4661-9696-421FD6935CDD}">
+<ds:datastoreItem xmlns:ds="http://schemas.openxmlformats.org/officeDocument/2006/customXml" ds:itemID="{5B26E0C9-B2AA-42E6-97B6-E1B7D9EAF129}">
   <ds:schemaRefs>
-    <ds:schemaRef ds:uri="http://schemas.microsoft.com/office/2006/metadata/properties"/>
-    <ds:schemaRef ds:uri="http://schemas.microsoft.com/office/infopath/2007/PartnerControls"/>
-    <ds:schemaRef ds:uri="71af3243-3dd4-4a8d-8c0d-dd76da1f02a5"/>
+    <ds:schemaRef ds:uri="http://schemas.microsoft.com/sharepoint/v3/contenttype/forms"/>
   </ds:schemaRefs>
 </ds:datastoreItem>
 </file>
@@ -27636,9 +27709,11 @@
 </file>
 
 <file path=customXml/itemProps3.xml><?xml version="1.0" encoding="utf-8"?>
-<ds:datastoreItem xmlns:ds="http://schemas.openxmlformats.org/officeDocument/2006/customXml" ds:itemID="{5B26E0C9-B2AA-42E6-97B6-E1B7D9EAF129}">
+<ds:datastoreItem xmlns:ds="http://schemas.openxmlformats.org/officeDocument/2006/customXml" ds:itemID="{F5757914-1161-4661-9696-421FD6935CDD}">
   <ds:schemaRefs>
-    <ds:schemaRef ds:uri="http://schemas.microsoft.com/sharepoint/v3/contenttype/forms"/>
+    <ds:schemaRef ds:uri="http://schemas.microsoft.com/office/2006/metadata/properties"/>
+    <ds:schemaRef ds:uri="http://schemas.microsoft.com/office/infopath/2007/PartnerControls"/>
+    <ds:schemaRef ds:uri="71af3243-3dd4-4a8d-8c0d-dd76da1f02a5"/>
   </ds:schemaRefs>
 </ds:datastoreItem>
 </file>
</xml_diff>